<commit_message>
Added recurrence relation samples
</commit_message>
<xml_diff>
--- a/Week 4 - Analysis of Algorithms and Asymptotic Notations/Asymptotic Notations.pptx
+++ b/Week 4 - Analysis of Algorithms and Asymptotic Notations/Asymptotic Notations.pptx
@@ -6448,8 +6448,8 @@
           </a:p>
         </p:txBody>
       </p:sp>
-      <mc:AlternateContent xmlns:mc="http://schemas.openxmlformats.org/markup-compatibility/2006">
-        <mc:Choice xmlns:a14="http://schemas.microsoft.com/office/drawing/2010/main" Requires="a14">
+      <mc:AlternateContent xmlns:mc="http://schemas.openxmlformats.org/markup-compatibility/2006" xmlns:a14="http://schemas.microsoft.com/office/drawing/2010/main">
+        <mc:Choice Requires="a14">
           <p:sp>
             <p:nvSpPr>
               <p:cNvPr id="3" name="TextBox 2">
@@ -6876,7 +6876,7 @@
             </p:txBody>
           </p:sp>
         </mc:Choice>
-        <mc:Fallback>
+        <mc:Fallback xmlns="">
           <p:sp>
             <p:nvSpPr>
               <p:cNvPr id="3" name="TextBox 2">
@@ -6921,8 +6921,8 @@
           </p:sp>
         </mc:Fallback>
       </mc:AlternateContent>
-      <mc:AlternateContent xmlns:mc="http://schemas.openxmlformats.org/markup-compatibility/2006" xmlns:a14="http://schemas.microsoft.com/office/drawing/2010/main">
-        <mc:Choice Requires="a14">
+      <mc:AlternateContent xmlns:mc="http://schemas.openxmlformats.org/markup-compatibility/2006">
+        <mc:Choice xmlns:a14="http://schemas.microsoft.com/office/drawing/2010/main" Requires="a14">
           <p:sp>
             <p:nvSpPr>
               <p:cNvPr id="6" name="TextBox 5">
@@ -6937,8 +6937,8 @@
             </p:nvSpPr>
             <p:spPr>
               <a:xfrm>
-                <a:off x="5021639" y="3071178"/>
-                <a:ext cx="2148721" cy="400110"/>
+                <a:off x="4500893" y="2991279"/>
+                <a:ext cx="3190207" cy="430887"/>
               </a:xfrm>
               <a:prstGeom prst="rect">
                 <a:avLst/>
@@ -6953,90 +6953,149 @@
               <a:p>
                 <a:pPr/>
                 <a14:m>
-                  <m:oMathPara xmlns:m="http://schemas.openxmlformats.org/officeDocument/2006/math">
-                    <m:oMathParaPr>
-                      <m:jc m:val="centerGroup"/>
-                    </m:oMathParaPr>
-                    <m:oMath xmlns:m="http://schemas.openxmlformats.org/officeDocument/2006/math">
-                      <m:r>
-                        <a:rPr lang="en-US" sz="2600" b="0" i="1" smtClean="0">
-                          <a:solidFill>
-                            <a:schemeClr val="tx1"/>
-                          </a:solidFill>
-                          <a:latin typeface="Cambria Math" panose="02040503050406030204" pitchFamily="18" charset="0"/>
-                        </a:rPr>
-                        <m:t>𝑓</m:t>
-                      </m:r>
-                      <m:d>
-                        <m:dPr>
-                          <m:ctrlPr>
-                            <a:rPr lang="en-US" sz="2600" b="0" i="1" smtClean="0">
-                              <a:solidFill>
-                                <a:schemeClr val="tx1"/>
-                              </a:solidFill>
-                              <a:latin typeface="Cambria Math" panose="02040503050406030204" pitchFamily="18" charset="0"/>
-                            </a:rPr>
-                          </m:ctrlPr>
-                        </m:dPr>
-                        <m:e>
-                          <m:r>
-                            <a:rPr lang="en-US" sz="2600" b="0" i="1" smtClean="0">
-                              <a:solidFill>
-                                <a:schemeClr val="tx1"/>
-                              </a:solidFill>
-                              <a:latin typeface="Cambria Math" panose="02040503050406030204" pitchFamily="18" charset="0"/>
-                            </a:rPr>
-                            <m:t>𝑛</m:t>
-                          </m:r>
-                        </m:e>
-                      </m:d>
-                      <m:r>
-                        <a:rPr lang="en-US" sz="2600" b="0" i="1" smtClean="0">
-                          <a:solidFill>
-                            <a:schemeClr val="tx1"/>
-                          </a:solidFill>
-                          <a:latin typeface="Cambria Math" panose="02040503050406030204" pitchFamily="18" charset="0"/>
-                        </a:rPr>
-                        <m:t>≤</m:t>
-                      </m:r>
-                      <m:r>
-                        <a:rPr lang="en-US" sz="2600" b="0" i="1" smtClean="0">
-                          <a:solidFill>
-                            <a:schemeClr val="tx1"/>
-                          </a:solidFill>
-                          <a:latin typeface="Cambria Math" panose="02040503050406030204" pitchFamily="18" charset="0"/>
-                        </a:rPr>
-                        <m:t>𝑔</m:t>
-                      </m:r>
-                      <m:r>
-                        <a:rPr lang="en-US" sz="2600" b="0" i="1" smtClean="0">
-                          <a:solidFill>
-                            <a:schemeClr val="tx1"/>
-                          </a:solidFill>
-                          <a:latin typeface="Cambria Math" panose="02040503050406030204" pitchFamily="18" charset="0"/>
-                        </a:rPr>
-                        <m:t>(</m:t>
-                      </m:r>
-                      <m:r>
-                        <a:rPr lang="en-US" sz="2600" b="0" i="1" smtClean="0">
-                          <a:solidFill>
-                            <a:schemeClr val="tx1"/>
-                          </a:solidFill>
-                          <a:latin typeface="Cambria Math" panose="02040503050406030204" pitchFamily="18" charset="0"/>
-                        </a:rPr>
-                        <m:t>𝑛</m:t>
-                      </m:r>
-                      <m:r>
-                        <a:rPr lang="en-US" sz="2600" b="0" i="1" smtClean="0">
-                          <a:solidFill>
-                            <a:schemeClr val="tx1"/>
-                          </a:solidFill>
-                          <a:latin typeface="Cambria Math" panose="02040503050406030204" pitchFamily="18" charset="0"/>
-                        </a:rPr>
-                        <m:t>)</m:t>
-                      </m:r>
-                    </m:oMath>
-                  </m:oMathPara>
+                  <m:oMath xmlns:m="http://schemas.openxmlformats.org/officeDocument/2006/math">
+                    <m:r>
+                      <a:rPr lang="en-US" sz="2600" b="0" i="1" smtClean="0">
+                        <a:solidFill>
+                          <a:schemeClr val="tx1"/>
+                        </a:solidFill>
+                        <a:latin typeface="Cambria Math" panose="02040503050406030204" pitchFamily="18" charset="0"/>
+                      </a:rPr>
+                      <m:t>𝑓</m:t>
+                    </m:r>
+                    <m:d>
+                      <m:dPr>
+                        <m:ctrlPr>
+                          <a:rPr lang="en-US" sz="2600" b="0" i="1" smtClean="0">
+                            <a:solidFill>
+                              <a:schemeClr val="tx1"/>
+                            </a:solidFill>
+                            <a:latin typeface="Cambria Math" panose="02040503050406030204" pitchFamily="18" charset="0"/>
+                          </a:rPr>
+                        </m:ctrlPr>
+                      </m:dPr>
+                      <m:e>
+                        <m:r>
+                          <a:rPr lang="en-US" sz="2600" b="0" i="1" smtClean="0">
+                            <a:solidFill>
+                              <a:schemeClr val="tx1"/>
+                            </a:solidFill>
+                            <a:latin typeface="Cambria Math" panose="02040503050406030204" pitchFamily="18" charset="0"/>
+                          </a:rPr>
+                          <m:t>𝑛</m:t>
+                        </m:r>
+                      </m:e>
+                    </m:d>
+                    <m:r>
+                      <a:rPr lang="en-US" sz="2600" b="0" i="1" smtClean="0">
+                        <a:solidFill>
+                          <a:schemeClr val="tx1"/>
+                        </a:solidFill>
+                        <a:latin typeface="Cambria Math" panose="02040503050406030204" pitchFamily="18" charset="0"/>
+                      </a:rPr>
+                      <m:t>≤</m:t>
+                    </m:r>
+                    <m:r>
+                      <a:rPr lang="en-US" sz="2600" b="0" i="1" smtClean="0">
+                        <a:solidFill>
+                          <a:schemeClr val="tx1"/>
+                        </a:solidFill>
+                        <a:latin typeface="Cambria Math" panose="02040503050406030204" pitchFamily="18" charset="0"/>
+                      </a:rPr>
+                      <m:t>𝑔</m:t>
+                    </m:r>
+                    <m:d>
+                      <m:dPr>
+                        <m:ctrlPr>
+                          <a:rPr lang="en-US" sz="2600" b="0" i="1" smtClean="0">
+                            <a:solidFill>
+                              <a:schemeClr val="tx1"/>
+                            </a:solidFill>
+                            <a:latin typeface="Cambria Math" panose="02040503050406030204" pitchFamily="18" charset="0"/>
+                          </a:rPr>
+                        </m:ctrlPr>
+                      </m:dPr>
+                      <m:e>
+                        <m:r>
+                          <a:rPr lang="en-US" sz="2600" b="0" i="1" smtClean="0">
+                            <a:solidFill>
+                              <a:schemeClr val="tx1"/>
+                            </a:solidFill>
+                            <a:latin typeface="Cambria Math" panose="02040503050406030204" pitchFamily="18" charset="0"/>
+                          </a:rPr>
+                          <m:t>𝑛</m:t>
+                        </m:r>
+                      </m:e>
+                    </m:d>
+                  </m:oMath>
+                </a14:m>
+                <a:r>
+                  <a:rPr lang="en-US" sz="2600" dirty="0">
+                    <a:solidFill>
+                      <a:schemeClr val="tx1"/>
+                    </a:solidFill>
+                  </a:rPr>
+                  <a:t> </a:t>
+                </a:r>
+                <a14:m>
+                  <m:oMath xmlns:m="http://schemas.openxmlformats.org/officeDocument/2006/math">
+                    <m:r>
+                      <a:rPr lang="el-GR" sz="2800" b="1" i="1">
+                        <a:latin typeface="Cambria Math" panose="02040503050406030204" pitchFamily="18" charset="0"/>
+                        <a:ea typeface="Cambria Math" panose="02040503050406030204" pitchFamily="18" charset="0"/>
+                      </a:rPr>
+                      <m:t>∀</m:t>
+                    </m:r>
+                    <m:r>
+                      <a:rPr lang="en-GB" sz="2800" b="1" i="1" smtClean="0">
+                        <a:latin typeface="Cambria Math" panose="02040503050406030204" pitchFamily="18" charset="0"/>
+                        <a:ea typeface="Cambria Math" panose="02040503050406030204" pitchFamily="18" charset="0"/>
+                      </a:rPr>
+                      <m:t> </m:t>
+                    </m:r>
+                    <m:r>
+                      <a:rPr lang="en-GB" sz="2800" b="0" i="1" smtClean="0">
+                        <a:latin typeface="Cambria Math" panose="02040503050406030204" pitchFamily="18" charset="0"/>
+                        <a:ea typeface="Cambria Math" panose="02040503050406030204" pitchFamily="18" charset="0"/>
+                      </a:rPr>
+                      <m:t>𝑛</m:t>
+                    </m:r>
+                    <m:r>
+                      <a:rPr lang="en-GB" sz="2800" b="0" i="1" smtClean="0">
+                        <a:latin typeface="Cambria Math" panose="02040503050406030204" pitchFamily="18" charset="0"/>
+                        <a:ea typeface="Cambria Math" panose="02040503050406030204" pitchFamily="18" charset="0"/>
+                      </a:rPr>
+                      <m:t>≥</m:t>
+                    </m:r>
+                    <m:sSub>
+                      <m:sSubPr>
+                        <m:ctrlPr>
+                          <a:rPr lang="en-GB" sz="2800" i="1" smtClean="0">
+                            <a:latin typeface="Cambria Math" panose="02040503050406030204" pitchFamily="18" charset="0"/>
+                            <a:ea typeface="Cambria Math" panose="02040503050406030204" pitchFamily="18" charset="0"/>
+                          </a:rPr>
+                        </m:ctrlPr>
+                      </m:sSubPr>
+                      <m:e>
+                        <m:r>
+                          <a:rPr lang="en-GB" sz="2800" b="0" i="1" smtClean="0">
+                            <a:latin typeface="Cambria Math" panose="02040503050406030204" pitchFamily="18" charset="0"/>
+                            <a:ea typeface="Cambria Math" panose="02040503050406030204" pitchFamily="18" charset="0"/>
+                          </a:rPr>
+                          <m:t>𝑛</m:t>
+                        </m:r>
+                      </m:e>
+                      <m:sub>
+                        <m:r>
+                          <a:rPr lang="en-GB" sz="2800" b="0" i="1" smtClean="0">
+                            <a:latin typeface="Cambria Math" panose="02040503050406030204" pitchFamily="18" charset="0"/>
+                            <a:ea typeface="Cambria Math" panose="02040503050406030204" pitchFamily="18" charset="0"/>
+                          </a:rPr>
+                          <m:t>0</m:t>
+                        </m:r>
+                      </m:sub>
+                    </m:sSub>
+                  </m:oMath>
                 </a14:m>
                 <a:endParaRPr lang="en-US" sz="2600" dirty="0">
                   <a:solidFill>
@@ -7047,7 +7106,7 @@
             </p:txBody>
           </p:sp>
         </mc:Choice>
-        <mc:Fallback xmlns="">
+        <mc:Fallback>
           <p:sp>
             <p:nvSpPr>
               <p:cNvPr id="6" name="TextBox 5">
@@ -7064,8 +7123,8 @@
             </p:nvSpPr>
             <p:spPr>
               <a:xfrm>
-                <a:off x="5021639" y="3071178"/>
-                <a:ext cx="2148721" cy="400110"/>
+                <a:off x="4500893" y="2991279"/>
+                <a:ext cx="3190207" cy="430887"/>
               </a:xfrm>
               <a:prstGeom prst="rect">
                 <a:avLst/>
@@ -7073,7 +7132,7 @@
               <a:blipFill>
                 <a:blip r:embed="rId5"/>
                 <a:stretch>
-                  <a:fillRect/>
+                  <a:fillRect l="-4762" t="-8571" r="-2381" b="-34286"/>
                 </a:stretch>
               </a:blipFill>
             </p:spPr>
@@ -7082,7 +7141,7 @@
               <a:lstStyle/>
               <a:p>
                 <a:r>
-                  <a:rPr lang="en-PH">
+                  <a:rPr lang="en-US">
                     <a:noFill/>
                   </a:rPr>
                   <a:t> </a:t>
@@ -9264,8 +9323,8 @@
           <a:chExt cx="0" cy="0"/>
         </a:xfrm>
       </p:grpSpPr>
-      <mc:AlternateContent xmlns:mc="http://schemas.openxmlformats.org/markup-compatibility/2006" xmlns:a14="http://schemas.microsoft.com/office/drawing/2010/main">
-        <mc:Choice Requires="a14">
+      <mc:AlternateContent xmlns:mc="http://schemas.openxmlformats.org/markup-compatibility/2006">
+        <mc:Choice xmlns:a14="http://schemas.microsoft.com/office/drawing/2010/main" Requires="a14">
           <p:sp>
             <p:nvSpPr>
               <p:cNvPr id="2" name="Title 1">
@@ -9285,7 +9344,7 @@
             <p:spPr>
               <a:xfrm>
                 <a:off x="1190625" y="497150"/>
-                <a:ext cx="9477375" cy="718459"/>
+                <a:ext cx="10019092" cy="718459"/>
               </a:xfrm>
             </p:spPr>
             <p:txBody>
@@ -9328,7 +9387,7 @@
             </p:txBody>
           </p:sp>
         </mc:Choice>
-        <mc:Fallback xmlns="">
+        <mc:Fallback>
           <p:sp>
             <p:nvSpPr>
               <p:cNvPr id="2" name="Title 1">
@@ -9348,12 +9407,12 @@
             <p:spPr>
               <a:xfrm>
                 <a:off x="1190625" y="497150"/>
-                <a:ext cx="9477375" cy="718459"/>
+                <a:ext cx="10019092" cy="718459"/>
               </a:xfrm>
               <a:blipFill>
                 <a:blip r:embed="rId4"/>
                 <a:stretch>
-                  <a:fillRect l="-2765" t="-51282" r="-2765" b="-52991"/>
+                  <a:fillRect l="-2532" t="-50877" r="-2532" b="-50877"/>
                 </a:stretch>
               </a:blipFill>
             </p:spPr>
@@ -9362,7 +9421,7 @@
               <a:lstStyle/>
               <a:p>
                 <a:r>
-                  <a:rPr lang="en-PH">
+                  <a:rPr lang="en-US">
                     <a:noFill/>
                   </a:rPr>
                   <a:t> </a:t>
@@ -9417,8 +9476,8 @@
           </a:p>
         </p:txBody>
       </p:sp>
-      <mc:AlternateContent xmlns:mc="http://schemas.openxmlformats.org/markup-compatibility/2006">
-        <mc:Choice xmlns:a14="http://schemas.microsoft.com/office/drawing/2010/main" Requires="a14">
+      <mc:AlternateContent xmlns:mc="http://schemas.openxmlformats.org/markup-compatibility/2006" xmlns:a14="http://schemas.microsoft.com/office/drawing/2010/main">
+        <mc:Choice Requires="a14">
           <p:sp>
             <p:nvSpPr>
               <p:cNvPr id="3" name="TextBox 2">
@@ -9836,7 +9895,7 @@
             </p:txBody>
           </p:sp>
         </mc:Choice>
-        <mc:Fallback>
+        <mc:Fallback xmlns="">
           <p:sp>
             <p:nvSpPr>
               <p:cNvPr id="3" name="TextBox 2">
@@ -9881,8 +9940,8 @@
           </p:sp>
         </mc:Fallback>
       </mc:AlternateContent>
-      <mc:AlternateContent xmlns:mc="http://schemas.openxmlformats.org/markup-compatibility/2006" xmlns:a14="http://schemas.microsoft.com/office/drawing/2010/main">
-        <mc:Choice Requires="a14">
+      <mc:AlternateContent xmlns:mc="http://schemas.openxmlformats.org/markup-compatibility/2006">
+        <mc:Choice xmlns:a14="http://schemas.microsoft.com/office/drawing/2010/main" Requires="a14">
           <p:sp>
             <p:nvSpPr>
               <p:cNvPr id="6" name="TextBox 5">
@@ -9897,8 +9956,8 @@
             </p:nvSpPr>
             <p:spPr>
               <a:xfrm>
-                <a:off x="5021639" y="3071178"/>
-                <a:ext cx="2148721" cy="400110"/>
+                <a:off x="4499684" y="3025214"/>
+                <a:ext cx="3192625" cy="400110"/>
               </a:xfrm>
               <a:prstGeom prst="rect">
                 <a:avLst/>
@@ -9968,33 +10027,94 @@
                         </a:rPr>
                         <m:t>𝑔</m:t>
                       </m:r>
+                      <m:d>
+                        <m:dPr>
+                          <m:ctrlPr>
+                            <a:rPr lang="en-US" sz="2600" b="0" i="1" smtClean="0">
+                              <a:solidFill>
+                                <a:schemeClr val="tx1"/>
+                              </a:solidFill>
+                              <a:latin typeface="Cambria Math" panose="02040503050406030204" pitchFamily="18" charset="0"/>
+                            </a:rPr>
+                          </m:ctrlPr>
+                        </m:dPr>
+                        <m:e>
+                          <m:r>
+                            <a:rPr lang="en-US" sz="2600" b="0" i="1" smtClean="0">
+                              <a:solidFill>
+                                <a:schemeClr val="tx1"/>
+                              </a:solidFill>
+                              <a:latin typeface="Cambria Math" panose="02040503050406030204" pitchFamily="18" charset="0"/>
+                            </a:rPr>
+                            <m:t>𝑛</m:t>
+                          </m:r>
+                        </m:e>
+                      </m:d>
                       <m:r>
-                        <a:rPr lang="en-US" sz="2600" b="0" i="1" smtClean="0">
+                        <a:rPr lang="en-GB" sz="2600" b="1" i="1" smtClean="0">
                           <a:solidFill>
                             <a:schemeClr val="tx1"/>
                           </a:solidFill>
                           <a:latin typeface="Cambria Math" panose="02040503050406030204" pitchFamily="18" charset="0"/>
                         </a:rPr>
-                        <m:t>(</m:t>
+                        <m:t> </m:t>
                       </m:r>
                       <m:r>
-                        <a:rPr lang="en-US" sz="2600" b="0" i="1" smtClean="0">
-                          <a:solidFill>
-                            <a:schemeClr val="tx1"/>
-                          </a:solidFill>
+                        <a:rPr lang="el-GR" sz="2600" b="1" i="1">
                           <a:latin typeface="Cambria Math" panose="02040503050406030204" pitchFamily="18" charset="0"/>
+                          <a:ea typeface="Cambria Math" panose="02040503050406030204" pitchFamily="18" charset="0"/>
+                        </a:rPr>
+                        <m:t>∀</m:t>
+                      </m:r>
+                      <m:r>
+                        <a:rPr lang="en-GB" sz="2600" b="1" i="1" smtClean="0">
+                          <a:latin typeface="Cambria Math" panose="02040503050406030204" pitchFamily="18" charset="0"/>
+                          <a:ea typeface="Cambria Math" panose="02040503050406030204" pitchFamily="18" charset="0"/>
+                        </a:rPr>
+                        <m:t> </m:t>
+                      </m:r>
+                      <m:r>
+                        <a:rPr lang="en-GB" sz="2600" i="1">
+                          <a:latin typeface="Cambria Math" panose="02040503050406030204" pitchFamily="18" charset="0"/>
+                          <a:ea typeface="Cambria Math" panose="02040503050406030204" pitchFamily="18" charset="0"/>
                         </a:rPr>
                         <m:t>𝑛</m:t>
                       </m:r>
                       <m:r>
-                        <a:rPr lang="en-US" sz="2600" b="0" i="1" smtClean="0">
-                          <a:solidFill>
-                            <a:schemeClr val="tx1"/>
-                          </a:solidFill>
+                        <a:rPr lang="en-GB" sz="2600" i="1">
                           <a:latin typeface="Cambria Math" panose="02040503050406030204" pitchFamily="18" charset="0"/>
+                          <a:ea typeface="Cambria Math" panose="02040503050406030204" pitchFamily="18" charset="0"/>
                         </a:rPr>
-                        <m:t>)</m:t>
+                        <m:t>≥</m:t>
                       </m:r>
+                      <m:sSub>
+                        <m:sSubPr>
+                          <m:ctrlPr>
+                            <a:rPr lang="en-GB" sz="2600" i="1">
+                              <a:latin typeface="Cambria Math" panose="02040503050406030204" pitchFamily="18" charset="0"/>
+                              <a:ea typeface="Cambria Math" panose="02040503050406030204" pitchFamily="18" charset="0"/>
+                            </a:rPr>
+                          </m:ctrlPr>
+                        </m:sSubPr>
+                        <m:e>
+                          <m:r>
+                            <a:rPr lang="en-GB" sz="2600" i="1">
+                              <a:latin typeface="Cambria Math" panose="02040503050406030204" pitchFamily="18" charset="0"/>
+                              <a:ea typeface="Cambria Math" panose="02040503050406030204" pitchFamily="18" charset="0"/>
+                            </a:rPr>
+                            <m:t>𝑛</m:t>
+                          </m:r>
+                        </m:e>
+                        <m:sub>
+                          <m:r>
+                            <a:rPr lang="en-GB" sz="2600" i="1">
+                              <a:latin typeface="Cambria Math" panose="02040503050406030204" pitchFamily="18" charset="0"/>
+                              <a:ea typeface="Cambria Math" panose="02040503050406030204" pitchFamily="18" charset="0"/>
+                            </a:rPr>
+                            <m:t>0</m:t>
+                          </m:r>
+                        </m:sub>
+                      </m:sSub>
                     </m:oMath>
                   </m:oMathPara>
                 </a14:m>
@@ -10007,7 +10127,7 @@
             </p:txBody>
           </p:sp>
         </mc:Choice>
-        <mc:Fallback xmlns="">
+        <mc:Fallback>
           <p:sp>
             <p:nvSpPr>
               <p:cNvPr id="6" name="TextBox 5">
@@ -10024,8 +10144,8 @@
             </p:nvSpPr>
             <p:spPr>
               <a:xfrm>
-                <a:off x="5021639" y="3071178"/>
-                <a:ext cx="2148721" cy="400110"/>
+                <a:off x="4499684" y="3025214"/>
+                <a:ext cx="3192625" cy="400110"/>
               </a:xfrm>
               <a:prstGeom prst="rect">
                 <a:avLst/>
@@ -10033,7 +10153,7 @@
               <a:blipFill>
                 <a:blip r:embed="rId6"/>
                 <a:stretch>
-                  <a:fillRect/>
+                  <a:fillRect l="-3175" t="-9375" r="-397" b="-37500"/>
                 </a:stretch>
               </a:blipFill>
             </p:spPr>
@@ -10042,7 +10162,7 @@
               <a:lstStyle/>
               <a:p>
                 <a:r>
-                  <a:rPr lang="en-PH">
+                  <a:rPr lang="en-US">
                     <a:noFill/>
                   </a:rPr>
                   <a:t> </a:t>
@@ -12125,8 +12245,8 @@
           </a:p>
         </p:txBody>
       </p:sp>
-      <mc:AlternateContent xmlns:mc="http://schemas.openxmlformats.org/markup-compatibility/2006">
-        <mc:Choice xmlns:a14="http://schemas.microsoft.com/office/drawing/2010/main" Requires="a14">
+      <mc:AlternateContent xmlns:mc="http://schemas.openxmlformats.org/markup-compatibility/2006" xmlns:a14="http://schemas.microsoft.com/office/drawing/2010/main">
+        <mc:Choice Requires="a14">
           <p:sp>
             <p:nvSpPr>
               <p:cNvPr id="3" name="TextBox 2">
@@ -12544,7 +12664,7 @@
             </p:txBody>
           </p:sp>
         </mc:Choice>
-        <mc:Fallback>
+        <mc:Fallback xmlns="">
           <p:sp>
             <p:nvSpPr>
               <p:cNvPr id="3" name="TextBox 2">
@@ -15309,12 +15429,6 @@
 </file>
 
 <file path=customXml/item1.xml><?xml version="1.0" encoding="utf-8"?>
-<p:properties xmlns:p="http://schemas.microsoft.com/office/2006/metadata/properties" xmlns:xsi="http://www.w3.org/2001/XMLSchema-instance" xmlns:pc="http://schemas.microsoft.com/office/infopath/2007/PartnerControls">
-  <documentManagement/>
-</p:properties>
-</file>
-
-<file path=customXml/item2.xml><?xml version="1.0" encoding="utf-8"?>
 <ct:contentTypeSchema xmlns:ct="http://schemas.microsoft.com/office/2006/metadata/contentType" xmlns:ma="http://schemas.microsoft.com/office/2006/metadata/properties/metaAttributes" ct:_="" ma:_="" ma:contentTypeName="Document" ma:contentTypeID="0x0101007188BDCA587B344BBA6CB1A93FAE6998" ma:contentTypeVersion="2" ma:contentTypeDescription="Create a new document." ma:contentTypeScope="" ma:versionID="7a8e4b6720badb2566a0cfeddfaf2856">
   <xsd:schema xmlns:xsd="http://www.w3.org/2001/XMLSchema" xmlns:xs="http://www.w3.org/2001/XMLSchema" xmlns:p="http://schemas.microsoft.com/office/2006/metadata/properties" xmlns:ns2="ba111d12-426d-4af0-bcb6-460e36974645" targetNamespace="http://schemas.microsoft.com/office/2006/metadata/properties" ma:root="true" ma:fieldsID="989b05398519136c88ba0a8d54e3c3da" ns2:_="">
     <xsd:import namespace="ba111d12-426d-4af0-bcb6-460e36974645"/>
@@ -15446,6 +15560,12 @@
 </ct:contentTypeSchema>
 </file>
 
+<file path=customXml/item2.xml><?xml version="1.0" encoding="utf-8"?>
+<p:properties xmlns:p="http://schemas.microsoft.com/office/2006/metadata/properties" xmlns:xsi="http://www.w3.org/2001/XMLSchema-instance" xmlns:pc="http://schemas.microsoft.com/office/infopath/2007/PartnerControls">
+  <documentManagement/>
+</p:properties>
+</file>
+
 <file path=customXml/item3.xml><?xml version="1.0" encoding="utf-8"?>
 <?mso-contentType ?>
 <FormTemplates xmlns="http://schemas.microsoft.com/sharepoint/v3/contenttype/forms">
@@ -15456,15 +15576,6 @@
 </file>
 
 <file path=customXml/itemProps1.xml><?xml version="1.0" encoding="utf-8"?>
-<ds:datastoreItem xmlns:ds="http://schemas.openxmlformats.org/officeDocument/2006/customXml" ds:itemID="{A05518A6-09E4-4E11-AE7D-4C13722BEBC7}">
-  <ds:schemaRefs>
-    <ds:schemaRef ds:uri="http://schemas.microsoft.com/office/2006/metadata/properties"/>
-    <ds:schemaRef ds:uri="http://schemas.microsoft.com/office/infopath/2007/PartnerControls"/>
-  </ds:schemaRefs>
-</ds:datastoreItem>
-</file>
-
-<file path=customXml/itemProps2.xml><?xml version="1.0" encoding="utf-8"?>
 <ds:datastoreItem xmlns:ds="http://schemas.openxmlformats.org/officeDocument/2006/customXml" ds:itemID="{46BFEDF5-8B64-4FF5-9637-4791A1C152B8}">
   <ds:schemaRefs>
     <ds:schemaRef ds:uri="http://schemas.microsoft.com/office/2006/metadata/contentType"/>
@@ -15482,6 +15593,15 @@
 </ds:datastoreItem>
 </file>
 
+<file path=customXml/itemProps2.xml><?xml version="1.0" encoding="utf-8"?>
+<ds:datastoreItem xmlns:ds="http://schemas.openxmlformats.org/officeDocument/2006/customXml" ds:itemID="{A05518A6-09E4-4E11-AE7D-4C13722BEBC7}">
+  <ds:schemaRefs>
+    <ds:schemaRef ds:uri="http://schemas.microsoft.com/office/2006/metadata/properties"/>
+    <ds:schemaRef ds:uri="http://schemas.microsoft.com/office/infopath/2007/PartnerControls"/>
+  </ds:schemaRefs>
+</ds:datastoreItem>
+</file>
+
 <file path=customXml/itemProps3.xml><?xml version="1.0" encoding="utf-8"?>
 <ds:datastoreItem xmlns:ds="http://schemas.openxmlformats.org/officeDocument/2006/customXml" ds:itemID="{AE0C03B0-3DE5-4BD9-B3BB-6E4919CD06B4}">
   <ds:schemaRefs>

</xml_diff>